<commit_message>
Finishing touches on slides
</commit_message>
<xml_diff>
--- a/HMM_decision_tasks.pptx
+++ b/HMM_decision_tasks.pptx
@@ -5,7 +5,7 @@
     <p:sldMasterId id="2147483648" r:id="rId1"/>
   </p:sldMasterIdLst>
   <p:notesMasterIdLst>
-    <p:notesMasterId r:id="rId29"/>
+    <p:notesMasterId r:id="rId31"/>
   </p:notesMasterIdLst>
   <p:sldIdLst>
     <p:sldId id="284" r:id="rId2"/>
@@ -35,6 +35,8 @@
     <p:sldId id="281" r:id="rId26"/>
     <p:sldId id="274" r:id="rId27"/>
     <p:sldId id="285" r:id="rId28"/>
+    <p:sldId id="286" r:id="rId29"/>
+    <p:sldId id="287" r:id="rId30"/>
   </p:sldIdLst>
   <p:sldSz cx="12192000" cy="6858000"/>
   <p:notesSz cx="6858000" cy="9144000"/>
@@ -223,7 +225,7 @@
           <a:p>
             <a:fld id="{C62351EF-60A8-41A7-916C-CE81AE14183A}" type="datetimeFigureOut">
               <a:rPr lang="en-US" smtClean="0"/>
-              <a:t>4/8/2022</a:t>
+              <a:t>4/14/2022</a:t>
             </a:fld>
             <a:endParaRPr lang="en-US"/>
           </a:p>
@@ -805,7 +807,7 @@
           <a:p>
             <a:fld id="{27468407-9B32-4CC7-9365-30F890A4D38E}" type="datetimeFigureOut">
               <a:rPr lang="en-US" smtClean="0"/>
-              <a:t>4/8/2022</a:t>
+              <a:t>4/14/2022</a:t>
             </a:fld>
             <a:endParaRPr lang="en-US"/>
           </a:p>
@@ -1003,7 +1005,7 @@
           <a:p>
             <a:fld id="{27468407-9B32-4CC7-9365-30F890A4D38E}" type="datetimeFigureOut">
               <a:rPr lang="en-US" smtClean="0"/>
-              <a:t>4/8/2022</a:t>
+              <a:t>4/14/2022</a:t>
             </a:fld>
             <a:endParaRPr lang="en-US"/>
           </a:p>
@@ -1211,7 +1213,7 @@
           <a:p>
             <a:fld id="{27468407-9B32-4CC7-9365-30F890A4D38E}" type="datetimeFigureOut">
               <a:rPr lang="en-US" smtClean="0"/>
-              <a:t>4/8/2022</a:t>
+              <a:t>4/14/2022</a:t>
             </a:fld>
             <a:endParaRPr lang="en-US"/>
           </a:p>
@@ -1409,7 +1411,7 @@
           <a:p>
             <a:fld id="{27468407-9B32-4CC7-9365-30F890A4D38E}" type="datetimeFigureOut">
               <a:rPr lang="en-US" smtClean="0"/>
-              <a:t>4/8/2022</a:t>
+              <a:t>4/14/2022</a:t>
             </a:fld>
             <a:endParaRPr lang="en-US"/>
           </a:p>
@@ -1684,7 +1686,7 @@
           <a:p>
             <a:fld id="{27468407-9B32-4CC7-9365-30F890A4D38E}" type="datetimeFigureOut">
               <a:rPr lang="en-US" smtClean="0"/>
-              <a:t>4/8/2022</a:t>
+              <a:t>4/14/2022</a:t>
             </a:fld>
             <a:endParaRPr lang="en-US"/>
           </a:p>
@@ -1949,7 +1951,7 @@
           <a:p>
             <a:fld id="{27468407-9B32-4CC7-9365-30F890A4D38E}" type="datetimeFigureOut">
               <a:rPr lang="en-US" smtClean="0"/>
-              <a:t>4/8/2022</a:t>
+              <a:t>4/14/2022</a:t>
             </a:fld>
             <a:endParaRPr lang="en-US"/>
           </a:p>
@@ -2361,7 +2363,7 @@
           <a:p>
             <a:fld id="{27468407-9B32-4CC7-9365-30F890A4D38E}" type="datetimeFigureOut">
               <a:rPr lang="en-US" smtClean="0"/>
-              <a:t>4/8/2022</a:t>
+              <a:t>4/14/2022</a:t>
             </a:fld>
             <a:endParaRPr lang="en-US"/>
           </a:p>
@@ -2502,7 +2504,7 @@
           <a:p>
             <a:fld id="{27468407-9B32-4CC7-9365-30F890A4D38E}" type="datetimeFigureOut">
               <a:rPr lang="en-US" smtClean="0"/>
-              <a:t>4/8/2022</a:t>
+              <a:t>4/14/2022</a:t>
             </a:fld>
             <a:endParaRPr lang="en-US"/>
           </a:p>
@@ -2615,7 +2617,7 @@
           <a:p>
             <a:fld id="{27468407-9B32-4CC7-9365-30F890A4D38E}" type="datetimeFigureOut">
               <a:rPr lang="en-US" smtClean="0"/>
-              <a:t>4/8/2022</a:t>
+              <a:t>4/14/2022</a:t>
             </a:fld>
             <a:endParaRPr lang="en-US"/>
           </a:p>
@@ -2926,7 +2928,7 @@
           <a:p>
             <a:fld id="{27468407-9B32-4CC7-9365-30F890A4D38E}" type="datetimeFigureOut">
               <a:rPr lang="en-US" smtClean="0"/>
-              <a:t>4/8/2022</a:t>
+              <a:t>4/14/2022</a:t>
             </a:fld>
             <a:endParaRPr lang="en-US"/>
           </a:p>
@@ -3214,7 +3216,7 @@
           <a:p>
             <a:fld id="{27468407-9B32-4CC7-9365-30F890A4D38E}" type="datetimeFigureOut">
               <a:rPr lang="en-US" smtClean="0"/>
-              <a:t>4/8/2022</a:t>
+              <a:t>4/14/2022</a:t>
             </a:fld>
             <a:endParaRPr lang="en-US"/>
           </a:p>
@@ -3455,7 +3457,7 @@
           <a:p>
             <a:fld id="{27468407-9B32-4CC7-9365-30F890A4D38E}" type="datetimeFigureOut">
               <a:rPr lang="en-US" smtClean="0"/>
-              <a:t>4/8/2022</a:t>
+              <a:t>4/14/2022</a:t>
             </a:fld>
             <a:endParaRPr lang="en-US"/>
           </a:p>
@@ -3900,10 +3902,9 @@
           </a:bodyPr>
           <a:lstStyle/>
           <a:p>
-            <a:pPr algn="l"/>
-            <a:r>
-              <a:rPr lang="en-US" sz="3200" dirty="0"/>
-              <a:t>1. Mice alternate between discrete strategies during perceptual decision-making</a:t>
+            <a:r>
+              <a:rPr lang="en-US" sz="3600" b="1" dirty="0"/>
+              <a:t>Hidden Markov Models for Decision Processes</a:t>
             </a:r>
             <a:br>
               <a:rPr lang="en-US" sz="3200" dirty="0"/>
@@ -3911,16 +3912,21 @@
             <a:br>
               <a:rPr lang="en-US" sz="3200" dirty="0"/>
             </a:br>
+            <a:r>
+              <a:rPr lang="en-US" sz="2400" dirty="0"/>
+              <a:t>Part 1. Mice alternate between discrete strategies during perceptual decision-making</a:t>
+            </a:r>
             <a:br>
-              <a:rPr lang="en-US" sz="3200" dirty="0"/>
+              <a:rPr lang="en-US" sz="2400" dirty="0"/>
             </a:br>
             <a:br>
-              <a:rPr lang="en-US" sz="3200" dirty="0"/>
+              <a:rPr lang="en-US" sz="2400" dirty="0"/>
             </a:br>
             <a:r>
-              <a:rPr lang="en-US" sz="3200" dirty="0"/>
-              <a:t>2. Hierarchical Hidden Markov Models with State Prediction</a:t>
-            </a:r>
+              <a:rPr lang="en-US" sz="2400" dirty="0"/>
+              <a:t>Part 2. Hierarchical Hidden Markov Models with State Prediction</a:t>
+            </a:r>
+            <a:endParaRPr lang="en-US" sz="3200" dirty="0"/>
           </a:p>
         </p:txBody>
       </p:sp>
@@ -6177,14 +6183,43 @@
           </a:p>
         </p:txBody>
       </p:sp>
-      <mc:AlternateContent xmlns:mc="http://schemas.openxmlformats.org/markup-compatibility/2006" xmlns:a14="http://schemas.microsoft.com/office/drawing/2010/main">
-        <mc:Choice Requires="a14">
+      <p:pic>
+        <p:nvPicPr>
+          <p:cNvPr id="5" name="Picture 4">
+            <a:extLst>
+              <a:ext uri="{FF2B5EF4-FFF2-40B4-BE49-F238E27FC236}">
+                <a16:creationId xmlns:a16="http://schemas.microsoft.com/office/drawing/2014/main" id="{5195F936-5C03-4F41-8DB9-13AA1E880668}"/>
+              </a:ext>
+            </a:extLst>
+          </p:cNvPr>
+          <p:cNvPicPr>
+            <a:picLocks noChangeAspect="1"/>
+          </p:cNvPicPr>
+          <p:nvPr/>
+        </p:nvPicPr>
+        <p:blipFill rotWithShape="1">
+          <a:blip r:embed="rId2"/>
+          <a:srcRect b="67611"/>
+          <a:stretch/>
+        </p:blipFill>
+        <p:spPr>
+          <a:xfrm>
+            <a:off x="3838579" y="4612220"/>
+            <a:ext cx="8353421" cy="2170966"/>
+          </a:xfrm>
+          <a:prstGeom prst="rect">
+            <a:avLst/>
+          </a:prstGeom>
+        </p:spPr>
+      </p:pic>
+      <mc:AlternateContent xmlns:mc="http://schemas.openxmlformats.org/markup-compatibility/2006">
+        <mc:Choice xmlns:a14="http://schemas.microsoft.com/office/drawing/2010/main" Requires="a14">
           <p:sp>
             <p:nvSpPr>
-              <p:cNvPr id="4" name="TextBox 3">
+              <p:cNvPr id="10" name="TextBox 9">
                 <a:extLst>
                   <a:ext uri="{FF2B5EF4-FFF2-40B4-BE49-F238E27FC236}">
-                    <a16:creationId xmlns:a16="http://schemas.microsoft.com/office/drawing/2014/main" id="{B17C8864-1B70-4028-9C55-C839B8FC4998}"/>
+                    <a16:creationId xmlns:a16="http://schemas.microsoft.com/office/drawing/2014/main" id="{9028391B-6BBE-4ACE-AC6F-9A7B3D9EDEE9}"/>
                   </a:ext>
                 </a:extLst>
               </p:cNvPr>
@@ -6193,7 +6228,7 @@
             </p:nvSpPr>
             <p:spPr>
               <a:xfrm>
-                <a:off x="5349240" y="1690688"/>
+                <a:off x="4945701" y="1690688"/>
                 <a:ext cx="6080760" cy="2203808"/>
               </a:xfrm>
               <a:prstGeom prst="rect">
@@ -6768,13 +6803,13 @@
             </p:txBody>
           </p:sp>
         </mc:Choice>
-        <mc:Fallback xmlns="">
+        <mc:Fallback>
           <p:sp>
             <p:nvSpPr>
-              <p:cNvPr id="4" name="TextBox 3">
+              <p:cNvPr id="10" name="TextBox 9">
                 <a:extLst>
                   <a:ext uri="{FF2B5EF4-FFF2-40B4-BE49-F238E27FC236}">
-                    <a16:creationId xmlns:a16="http://schemas.microsoft.com/office/drawing/2014/main" id="{B17C8864-1B70-4028-9C55-C839B8FC4998}"/>
+                    <a16:creationId xmlns:a16="http://schemas.microsoft.com/office/drawing/2014/main" id="{9028391B-6BBE-4ACE-AC6F-9A7B3D9EDEE9}"/>
                   </a:ext>
                 </a:extLst>
               </p:cNvPr>
@@ -6785,16 +6820,16 @@
             </p:nvSpPr>
             <p:spPr>
               <a:xfrm>
-                <a:off x="5349240" y="1690688"/>
+                <a:off x="4945701" y="1690688"/>
                 <a:ext cx="6080760" cy="2203808"/>
               </a:xfrm>
               <a:prstGeom prst="rect">
                 <a:avLst/>
               </a:prstGeom>
               <a:blipFill>
-                <a:blip r:embed="rId2"/>
+                <a:blip r:embed="rId3"/>
                 <a:stretch>
-                  <a:fillRect l="-1505" t="-9116"/>
+                  <a:fillRect l="-1403" t="-9116"/>
                 </a:stretch>
               </a:blipFill>
             </p:spPr>
@@ -6813,35 +6848,186 @@
           </p:sp>
         </mc:Fallback>
       </mc:AlternateContent>
-      <p:pic>
-        <p:nvPicPr>
-          <p:cNvPr id="5" name="Picture 4">
+      <p:grpSp>
+        <p:nvGrpSpPr>
+          <p:cNvPr id="11" name="Group 10">
             <a:extLst>
               <a:ext uri="{FF2B5EF4-FFF2-40B4-BE49-F238E27FC236}">
-                <a16:creationId xmlns:a16="http://schemas.microsoft.com/office/drawing/2014/main" id="{5195F936-5C03-4F41-8DB9-13AA1E880668}"/>
+                <a16:creationId xmlns:a16="http://schemas.microsoft.com/office/drawing/2014/main" id="{BD604895-525F-40D0-99C0-4C92849B3012}"/>
               </a:ext>
             </a:extLst>
           </p:cNvPr>
-          <p:cNvPicPr>
-            <a:picLocks noChangeAspect="1"/>
-          </p:cNvPicPr>
+          <p:cNvGrpSpPr/>
           <p:nvPr/>
-        </p:nvPicPr>
-        <p:blipFill rotWithShape="1">
-          <a:blip r:embed="rId3"/>
-          <a:srcRect b="67611"/>
-          <a:stretch/>
-        </p:blipFill>
-        <p:spPr>
+        </p:nvGrpSpPr>
+        <p:grpSpPr>
           <a:xfrm>
-            <a:off x="3838579" y="4612220"/>
-            <a:ext cx="8353421" cy="2170966"/>
+            <a:off x="8049296" y="74814"/>
+            <a:ext cx="4004436" cy="2427980"/>
+            <a:chOff x="8223104" y="-142945"/>
+            <a:chExt cx="4632104" cy="2769438"/>
           </a:xfrm>
-          <a:prstGeom prst="rect">
-            <a:avLst/>
-          </a:prstGeom>
-        </p:spPr>
-      </p:pic>
+        </p:grpSpPr>
+        <p:pic>
+          <p:nvPicPr>
+            <p:cNvPr id="12" name="Content Placeholder 4">
+              <a:extLst>
+                <a:ext uri="{FF2B5EF4-FFF2-40B4-BE49-F238E27FC236}">
+                  <a16:creationId xmlns:a16="http://schemas.microsoft.com/office/drawing/2014/main" id="{C2CE799F-D52E-44E1-9405-DB22ED7E049D}"/>
+                </a:ext>
+              </a:extLst>
+            </p:cNvPr>
+            <p:cNvPicPr>
+              <a:picLocks noChangeAspect="1"/>
+            </p:cNvPicPr>
+            <p:nvPr/>
+          </p:nvPicPr>
+          <p:blipFill rotWithShape="1">
+            <a:blip r:embed="rId4"/>
+            <a:srcRect l="3534" t="33633" r="33243" b="36313"/>
+            <a:stretch/>
+          </p:blipFill>
+          <p:spPr>
+            <a:xfrm>
+              <a:off x="8223104" y="608803"/>
+              <a:ext cx="4632104" cy="2017690"/>
+            </a:xfrm>
+            <a:prstGeom prst="rect">
+              <a:avLst/>
+            </a:prstGeom>
+          </p:spPr>
+        </p:pic>
+        <p:sp>
+          <p:nvSpPr>
+            <p:cNvPr id="13" name="TextBox 12">
+              <a:extLst>
+                <a:ext uri="{FF2B5EF4-FFF2-40B4-BE49-F238E27FC236}">
+                  <a16:creationId xmlns:a16="http://schemas.microsoft.com/office/drawing/2014/main" id="{1390CD5E-B4E6-4198-900A-11A6C1A318B2}"/>
+                </a:ext>
+              </a:extLst>
+            </p:cNvPr>
+            <p:cNvSpPr txBox="1"/>
+            <p:nvPr/>
+          </p:nvSpPr>
+          <p:spPr>
+            <a:xfrm>
+              <a:off x="10735634" y="-142945"/>
+              <a:ext cx="1991451" cy="369332"/>
+            </a:xfrm>
+            <a:prstGeom prst="rect">
+              <a:avLst/>
+            </a:prstGeom>
+            <a:noFill/>
+          </p:spPr>
+          <p:txBody>
+            <a:bodyPr wrap="square">
+              <a:spAutoFit/>
+            </a:bodyPr>
+            <a:lstStyle/>
+            <a:p>
+              <a:pPr/>
+              <a:r>
+                <a:rPr lang="en-US" dirty="0"/>
+                <a:t>Logistic regressions</a:t>
+              </a:r>
+            </a:p>
+          </p:txBody>
+        </p:sp>
+        <mc:AlternateContent xmlns:mc="http://schemas.openxmlformats.org/markup-compatibility/2006">
+          <mc:Choice xmlns:a14="http://schemas.microsoft.com/office/drawing/2010/main" Requires="a14">
+            <p:sp>
+              <p:nvSpPr>
+                <p:cNvPr id="14" name="TextBox 13">
+                  <a:extLst>
+                    <a:ext uri="{FF2B5EF4-FFF2-40B4-BE49-F238E27FC236}">
+                      <a16:creationId xmlns:a16="http://schemas.microsoft.com/office/drawing/2014/main" id="{A79B5E54-42DE-486B-9B61-F46642FCFA4D}"/>
+                    </a:ext>
+                  </a:extLst>
+                </p:cNvPr>
+                <p:cNvSpPr txBox="1"/>
+                <p:nvPr/>
+              </p:nvSpPr>
+              <p:spPr>
+                <a:xfrm>
+                  <a:off x="8375504" y="71098"/>
+                  <a:ext cx="2081563" cy="454651"/>
+                </a:xfrm>
+                <a:prstGeom prst="rect">
+                  <a:avLst/>
+                </a:prstGeom>
+                <a:noFill/>
+              </p:spPr>
+              <p:txBody>
+                <a:bodyPr wrap="square">
+                  <a:spAutoFit/>
+                </a:bodyPr>
+                <a:lstStyle/>
+                <a:p>
+                  <a:pPr/>
+                  <a14:m>
+                    <m:oMath xmlns:m="http://schemas.openxmlformats.org/officeDocument/2006/math">
+                      <m:r>
+                        <a:rPr lang="en-US" sz="1800" b="1" i="0" dirty="0" smtClean="0">
+                          <a:latin typeface="Cambria Math" panose="02040503050406030204" pitchFamily="18" charset="0"/>
+                        </a:rPr>
+                        <m:t>𝐀</m:t>
+                      </m:r>
+                    </m:oMath>
+                  </a14:m>
+                  <a:r>
+                    <a:rPr lang="en-US" dirty="0"/>
+                    <a:t> matrix</a:t>
+                  </a:r>
+                </a:p>
+              </p:txBody>
+            </p:sp>
+          </mc:Choice>
+          <mc:Fallback>
+            <p:sp>
+              <p:nvSpPr>
+                <p:cNvPr id="14" name="TextBox 13">
+                  <a:extLst>
+                    <a:ext uri="{FF2B5EF4-FFF2-40B4-BE49-F238E27FC236}">
+                      <a16:creationId xmlns:a16="http://schemas.microsoft.com/office/drawing/2014/main" id="{A79B5E54-42DE-486B-9B61-F46642FCFA4D}"/>
+                    </a:ext>
+                  </a:extLst>
+                </p:cNvPr>
+                <p:cNvSpPr txBox="1">
+                  <a:spLocks noRot="1" noChangeAspect="1" noMove="1" noResize="1" noEditPoints="1" noAdjustHandles="1" noChangeArrowheads="1" noChangeShapeType="1" noTextEdit="1"/>
+                </p:cNvSpPr>
+                <p:nvPr/>
+              </p:nvSpPr>
+              <p:spPr>
+                <a:xfrm>
+                  <a:off x="8375504" y="71098"/>
+                  <a:ext cx="2081563" cy="454651"/>
+                </a:xfrm>
+                <a:prstGeom prst="rect">
+                  <a:avLst/>
+                </a:prstGeom>
+                <a:blipFill>
+                  <a:blip r:embed="rId5"/>
+                  <a:stretch>
+                    <a:fillRect t="-7692" b="-16923"/>
+                  </a:stretch>
+                </a:blipFill>
+              </p:spPr>
+              <p:txBody>
+                <a:bodyPr/>
+                <a:lstStyle/>
+                <a:p>
+                  <a:r>
+                    <a:rPr lang="en-US">
+                      <a:noFill/>
+                    </a:rPr>
+                    <a:t> </a:t>
+                  </a:r>
+                </a:p>
+              </p:txBody>
+            </p:sp>
+          </mc:Fallback>
+        </mc:AlternateContent>
+      </p:grpSp>
     </p:spTree>
     <p:extLst>
       <p:ext uri="{BB962C8B-B14F-4D97-AF65-F5344CB8AC3E}">
@@ -6923,8 +7109,8 @@
           </a:p>
         </p:txBody>
       </p:sp>
-      <mc:AlternateContent xmlns:mc="http://schemas.openxmlformats.org/markup-compatibility/2006" xmlns:a14="http://schemas.microsoft.com/office/drawing/2010/main">
-        <mc:Choice Requires="a14">
+      <mc:AlternateContent xmlns:mc="http://schemas.openxmlformats.org/markup-compatibility/2006">
+        <mc:Choice xmlns:a14="http://schemas.microsoft.com/office/drawing/2010/main" Requires="a14">
           <p:sp>
             <p:nvSpPr>
               <p:cNvPr id="4" name="TextBox 3">
@@ -6939,7 +7125,7 @@
             </p:nvSpPr>
             <p:spPr>
               <a:xfrm>
-                <a:off x="5349240" y="1690688"/>
+                <a:off x="4945701" y="1690688"/>
                 <a:ext cx="6080760" cy="2845907"/>
               </a:xfrm>
               <a:prstGeom prst="rect">
@@ -7827,7 +8013,7 @@
             </p:txBody>
           </p:sp>
         </mc:Choice>
-        <mc:Fallback xmlns="">
+        <mc:Fallback>
           <p:sp>
             <p:nvSpPr>
               <p:cNvPr id="4" name="TextBox 3">
@@ -7844,7 +8030,7 @@
             </p:nvSpPr>
             <p:spPr>
               <a:xfrm>
-                <a:off x="5349240" y="1690688"/>
+                <a:off x="4945701" y="1690688"/>
                 <a:ext cx="6080760" cy="2845907"/>
               </a:xfrm>
               <a:prstGeom prst="rect">
@@ -7853,7 +8039,7 @@
               <a:blipFill>
                 <a:blip r:embed="rId2"/>
                 <a:stretch>
-                  <a:fillRect l="-2608" t="-7066"/>
+                  <a:fillRect l="-2505" t="-7066"/>
                 </a:stretch>
               </a:blipFill>
             </p:spPr>
@@ -7934,6 +8120,186 @@
           </a:p>
         </p:txBody>
       </p:sp>
+      <p:grpSp>
+        <p:nvGrpSpPr>
+          <p:cNvPr id="6" name="Group 5">
+            <a:extLst>
+              <a:ext uri="{FF2B5EF4-FFF2-40B4-BE49-F238E27FC236}">
+                <a16:creationId xmlns:a16="http://schemas.microsoft.com/office/drawing/2014/main" id="{B9D32826-1D65-4E03-A4C2-F185A13204AE}"/>
+              </a:ext>
+            </a:extLst>
+          </p:cNvPr>
+          <p:cNvGrpSpPr/>
+          <p:nvPr/>
+        </p:nvGrpSpPr>
+        <p:grpSpPr>
+          <a:xfrm>
+            <a:off x="8049296" y="74814"/>
+            <a:ext cx="4004436" cy="2427980"/>
+            <a:chOff x="8223104" y="-142945"/>
+            <a:chExt cx="4632104" cy="2769438"/>
+          </a:xfrm>
+        </p:grpSpPr>
+        <p:pic>
+          <p:nvPicPr>
+            <p:cNvPr id="7" name="Content Placeholder 4">
+              <a:extLst>
+                <a:ext uri="{FF2B5EF4-FFF2-40B4-BE49-F238E27FC236}">
+                  <a16:creationId xmlns:a16="http://schemas.microsoft.com/office/drawing/2014/main" id="{4D4A9A96-D7E4-4216-A127-D745AD210CFB}"/>
+                </a:ext>
+              </a:extLst>
+            </p:cNvPr>
+            <p:cNvPicPr>
+              <a:picLocks noChangeAspect="1"/>
+            </p:cNvPicPr>
+            <p:nvPr/>
+          </p:nvPicPr>
+          <p:blipFill rotWithShape="1">
+            <a:blip r:embed="rId4"/>
+            <a:srcRect l="3534" t="33633" r="33243" b="36313"/>
+            <a:stretch/>
+          </p:blipFill>
+          <p:spPr>
+            <a:xfrm>
+              <a:off x="8223104" y="608803"/>
+              <a:ext cx="4632104" cy="2017690"/>
+            </a:xfrm>
+            <a:prstGeom prst="rect">
+              <a:avLst/>
+            </a:prstGeom>
+          </p:spPr>
+        </p:pic>
+        <p:sp>
+          <p:nvSpPr>
+            <p:cNvPr id="8" name="TextBox 7">
+              <a:extLst>
+                <a:ext uri="{FF2B5EF4-FFF2-40B4-BE49-F238E27FC236}">
+                  <a16:creationId xmlns:a16="http://schemas.microsoft.com/office/drawing/2014/main" id="{FDA70B26-97C0-4E7E-8E0B-272A3867D517}"/>
+                </a:ext>
+              </a:extLst>
+            </p:cNvPr>
+            <p:cNvSpPr txBox="1"/>
+            <p:nvPr/>
+          </p:nvSpPr>
+          <p:spPr>
+            <a:xfrm>
+              <a:off x="10735634" y="-142945"/>
+              <a:ext cx="1991451" cy="369332"/>
+            </a:xfrm>
+            <a:prstGeom prst="rect">
+              <a:avLst/>
+            </a:prstGeom>
+            <a:noFill/>
+          </p:spPr>
+          <p:txBody>
+            <a:bodyPr wrap="square">
+              <a:spAutoFit/>
+            </a:bodyPr>
+            <a:lstStyle/>
+            <a:p>
+              <a:pPr/>
+              <a:r>
+                <a:rPr lang="en-US" dirty="0"/>
+                <a:t>Logistic regressions</a:t>
+              </a:r>
+            </a:p>
+          </p:txBody>
+        </p:sp>
+        <mc:AlternateContent xmlns:mc="http://schemas.openxmlformats.org/markup-compatibility/2006">
+          <mc:Choice xmlns:a14="http://schemas.microsoft.com/office/drawing/2010/main" Requires="a14">
+            <p:sp>
+              <p:nvSpPr>
+                <p:cNvPr id="10" name="TextBox 9">
+                  <a:extLst>
+                    <a:ext uri="{FF2B5EF4-FFF2-40B4-BE49-F238E27FC236}">
+                      <a16:creationId xmlns:a16="http://schemas.microsoft.com/office/drawing/2014/main" id="{3E5B8D80-3F55-4BC8-91D9-475BEB82AB9E}"/>
+                    </a:ext>
+                  </a:extLst>
+                </p:cNvPr>
+                <p:cNvSpPr txBox="1"/>
+                <p:nvPr/>
+              </p:nvSpPr>
+              <p:spPr>
+                <a:xfrm>
+                  <a:off x="8375504" y="71098"/>
+                  <a:ext cx="2081563" cy="454651"/>
+                </a:xfrm>
+                <a:prstGeom prst="rect">
+                  <a:avLst/>
+                </a:prstGeom>
+                <a:noFill/>
+              </p:spPr>
+              <p:txBody>
+                <a:bodyPr wrap="square">
+                  <a:spAutoFit/>
+                </a:bodyPr>
+                <a:lstStyle/>
+                <a:p>
+                  <a:pPr/>
+                  <a14:m>
+                    <m:oMath xmlns:m="http://schemas.openxmlformats.org/officeDocument/2006/math">
+                      <m:r>
+                        <a:rPr lang="en-US" sz="1800" b="1" i="0" dirty="0" smtClean="0">
+                          <a:latin typeface="Cambria Math" panose="02040503050406030204" pitchFamily="18" charset="0"/>
+                        </a:rPr>
+                        <m:t>𝐀</m:t>
+                      </m:r>
+                    </m:oMath>
+                  </a14:m>
+                  <a:r>
+                    <a:rPr lang="en-US" dirty="0"/>
+                    <a:t> matrix</a:t>
+                  </a:r>
+                </a:p>
+              </p:txBody>
+            </p:sp>
+          </mc:Choice>
+          <mc:Fallback>
+            <p:sp>
+              <p:nvSpPr>
+                <p:cNvPr id="10" name="TextBox 9">
+                  <a:extLst>
+                    <a:ext uri="{FF2B5EF4-FFF2-40B4-BE49-F238E27FC236}">
+                      <a16:creationId xmlns:a16="http://schemas.microsoft.com/office/drawing/2014/main" id="{3E5B8D80-3F55-4BC8-91D9-475BEB82AB9E}"/>
+                    </a:ext>
+                  </a:extLst>
+                </p:cNvPr>
+                <p:cNvSpPr txBox="1">
+                  <a:spLocks noRot="1" noChangeAspect="1" noMove="1" noResize="1" noEditPoints="1" noAdjustHandles="1" noChangeArrowheads="1" noChangeShapeType="1" noTextEdit="1"/>
+                </p:cNvSpPr>
+                <p:nvPr/>
+              </p:nvSpPr>
+              <p:spPr>
+                <a:xfrm>
+                  <a:off x="8375504" y="71098"/>
+                  <a:ext cx="2081563" cy="454651"/>
+                </a:xfrm>
+                <a:prstGeom prst="rect">
+                  <a:avLst/>
+                </a:prstGeom>
+                <a:blipFill>
+                  <a:blip r:embed="rId5"/>
+                  <a:stretch>
+                    <a:fillRect t="-7692" b="-16923"/>
+                  </a:stretch>
+                </a:blipFill>
+              </p:spPr>
+              <p:txBody>
+                <a:bodyPr/>
+                <a:lstStyle/>
+                <a:p>
+                  <a:r>
+                    <a:rPr lang="en-US">
+                      <a:noFill/>
+                    </a:rPr>
+                    <a:t> </a:t>
+                  </a:r>
+                </a:p>
+              </p:txBody>
+            </p:sp>
+          </mc:Fallback>
+        </mc:AlternateContent>
+      </p:grpSp>
     </p:spTree>
     <p:extLst>
       <p:ext uri="{BB962C8B-B14F-4D97-AF65-F5344CB8AC3E}">
@@ -7992,8 +8358,8 @@
           </a:p>
         </p:txBody>
       </p:sp>
-      <mc:AlternateContent xmlns:mc="http://schemas.openxmlformats.org/markup-compatibility/2006">
-        <mc:Choice xmlns:a14="http://schemas.microsoft.com/office/drawing/2010/main" Requires="a14">
+      <mc:AlternateContent xmlns:mc="http://schemas.openxmlformats.org/markup-compatibility/2006" xmlns:a14="http://schemas.microsoft.com/office/drawing/2010/main">
+        <mc:Choice Requires="a14">
           <p:graphicFrame>
             <p:nvGraphicFramePr>
               <p:cNvPr id="5" name="Table 5">
@@ -8053,6 +8419,7 @@
                         <a:bodyPr/>
                         <a:lstStyle/>
                         <a:p>
+                          <a:pPr/>
                           <a14:m>
                             <m:oMathPara xmlns:m="http://schemas.openxmlformats.org/officeDocument/2006/math">
                               <m:oMathParaPr>
@@ -8155,13 +8522,7 @@
                                   <a:rPr lang="en-US" sz="1200" b="0" i="1" dirty="0" smtClean="0">
                                     <a:latin typeface="Cambria Math" panose="02040503050406030204" pitchFamily="18" charset="0"/>
                                   </a:rPr>
-                                  <m:t>=</m:t>
-                                </m:r>
-                                <m:r>
-                                  <a:rPr lang="en-US" sz="1200" b="0" i="1" dirty="0" smtClean="0">
-                                    <a:latin typeface="Cambria Math" panose="02040503050406030204" pitchFamily="18" charset="0"/>
-                                  </a:rPr>
-                                  <m:t>1</m:t>
+                                  <m:t>=1</m:t>
                                 </m:r>
                                 <m:r>
                                   <a:rPr lang="en-US" sz="1200" i="1" dirty="0" smtClean="0">
@@ -8308,13 +8669,7 @@
                                   <a:rPr lang="en-US" sz="1200" b="0" i="1" dirty="0" smtClean="0">
                                     <a:latin typeface="Cambria Math" panose="02040503050406030204" pitchFamily="18" charset="0"/>
                                   </a:rPr>
-                                  <m:t>=</m:t>
-                                </m:r>
-                                <m:r>
-                                  <a:rPr lang="en-US" sz="1200" b="0" i="1" dirty="0" smtClean="0">
-                                    <a:latin typeface="Cambria Math" panose="02040503050406030204" pitchFamily="18" charset="0"/>
-                                  </a:rPr>
-                                  <m:t>2</m:t>
+                                  <m:t>=2</m:t>
                                 </m:r>
                                 <m:r>
                                   <a:rPr lang="en-US" sz="1200" i="1" dirty="0" smtClean="0">
@@ -8464,13 +8819,7 @@
                                   <a:rPr lang="en-US" sz="1200" b="0" i="1" dirty="0" smtClean="0">
                                     <a:latin typeface="Cambria Math" panose="02040503050406030204" pitchFamily="18" charset="0"/>
                                   </a:rPr>
-                                  <m:t>=</m:t>
-                                </m:r>
-                                <m:r>
-                                  <a:rPr lang="en-US" sz="1200" b="0" i="1" dirty="0" smtClean="0">
-                                    <a:latin typeface="Cambria Math" panose="02040503050406030204" pitchFamily="18" charset="0"/>
-                                  </a:rPr>
-                                  <m:t>3</m:t>
+                                  <m:t>=3</m:t>
                                 </m:r>
                                 <m:r>
                                   <a:rPr lang="en-US" sz="1200" i="1" dirty="0" smtClean="0">
@@ -8771,13 +9120,7 @@
                                   <a:rPr lang="en-US" sz="1200" b="0" i="1" dirty="0" smtClean="0">
                                     <a:latin typeface="Cambria Math" panose="02040503050406030204" pitchFamily="18" charset="0"/>
                                   </a:rPr>
-                                  <m:t>=</m:t>
-                                </m:r>
-                                <m:r>
-                                  <a:rPr lang="en-US" sz="1200" b="0" i="1" dirty="0" smtClean="0">
-                                    <a:latin typeface="Cambria Math" panose="02040503050406030204" pitchFamily="18" charset="0"/>
-                                  </a:rPr>
-                                  <m:t>2</m:t>
+                                  <m:t>=2</m:t>
                                 </m:r>
                                 <m:r>
                                   <a:rPr lang="en-US" sz="1200" i="1" dirty="0" smtClean="0">
@@ -8921,13 +9264,7 @@
                                   <a:rPr lang="en-US" sz="1200" b="0" i="1" dirty="0" smtClean="0">
                                     <a:latin typeface="Cambria Math" panose="02040503050406030204" pitchFamily="18" charset="0"/>
                                   </a:rPr>
-                                  <m:t>=</m:t>
-                                </m:r>
-                                <m:r>
-                                  <a:rPr lang="en-US" sz="1200" b="0" i="1" dirty="0" smtClean="0">
-                                    <a:latin typeface="Cambria Math" panose="02040503050406030204" pitchFamily="18" charset="0"/>
-                                  </a:rPr>
-                                  <m:t>3</m:t>
+                                  <m:t>=3</m:t>
                                 </m:r>
                                 <m:r>
                                   <a:rPr lang="en-US" sz="1200" i="1" dirty="0" smtClean="0">
@@ -9228,13 +9565,7 @@
                                   <a:rPr lang="en-US" sz="1200" b="0" i="1" dirty="0" smtClean="0">
                                     <a:latin typeface="Cambria Math" panose="02040503050406030204" pitchFamily="18" charset="0"/>
                                   </a:rPr>
-                                  <m:t>=</m:t>
-                                </m:r>
-                                <m:r>
-                                  <a:rPr lang="en-US" sz="1200" b="0" i="1" dirty="0" smtClean="0">
-                                    <a:latin typeface="Cambria Math" panose="02040503050406030204" pitchFamily="18" charset="0"/>
-                                  </a:rPr>
-                                  <m:t>2</m:t>
+                                  <m:t>=2</m:t>
                                 </m:r>
                                 <m:r>
                                   <a:rPr lang="en-US" sz="1200" i="1" dirty="0" smtClean="0">
@@ -9384,13 +9715,7 @@
                                   <a:rPr lang="en-US" sz="1200" b="0" i="1" dirty="0" smtClean="0">
                                     <a:latin typeface="Cambria Math" panose="02040503050406030204" pitchFamily="18" charset="0"/>
                                   </a:rPr>
-                                  <m:t>=</m:t>
-                                </m:r>
-                                <m:r>
-                                  <a:rPr lang="en-US" sz="1200" b="0" i="1" dirty="0" smtClean="0">
-                                    <a:latin typeface="Cambria Math" panose="02040503050406030204" pitchFamily="18" charset="0"/>
-                                  </a:rPr>
-                                  <m:t>3</m:t>
+                                  <m:t>=3</m:t>
                                 </m:r>
                                 <m:r>
                                   <a:rPr lang="en-US" sz="1200" i="1" dirty="0" smtClean="0">
@@ -9427,7 +9752,7 @@
             </a:graphic>
           </p:graphicFrame>
         </mc:Choice>
-        <mc:Fallback>
+        <mc:Fallback xmlns="">
           <p:graphicFrame>
             <p:nvGraphicFramePr>
               <p:cNvPr id="5" name="Table 5">
@@ -9661,8 +9986,8 @@
           </p:graphicFrame>
         </mc:Fallback>
       </mc:AlternateContent>
-      <mc:AlternateContent xmlns:mc="http://schemas.openxmlformats.org/markup-compatibility/2006">
-        <mc:Choice xmlns:a14="http://schemas.microsoft.com/office/drawing/2010/main" Requires="a14">
+      <mc:AlternateContent xmlns:mc="http://schemas.openxmlformats.org/markup-compatibility/2006" xmlns:a14="http://schemas.microsoft.com/office/drawing/2010/main">
+        <mc:Choice Requires="a14">
           <p:sp>
             <p:nvSpPr>
               <p:cNvPr id="7" name="TextBox 6">
@@ -9877,7 +10202,7 @@
             </p:txBody>
           </p:sp>
         </mc:Choice>
-        <mc:Fallback>
+        <mc:Fallback xmlns="">
           <p:sp>
             <p:nvSpPr>
               <p:cNvPr id="7" name="TextBox 6">
@@ -9922,8 +10247,8 @@
           </p:sp>
         </mc:Fallback>
       </mc:AlternateContent>
-      <mc:AlternateContent xmlns:mc="http://schemas.openxmlformats.org/markup-compatibility/2006">
-        <mc:Choice xmlns:a14="http://schemas.microsoft.com/office/drawing/2010/main" Requires="a14">
+      <mc:AlternateContent xmlns:mc="http://schemas.openxmlformats.org/markup-compatibility/2006" xmlns:a14="http://schemas.microsoft.com/office/drawing/2010/main">
+        <mc:Choice Requires="a14">
           <p:sp>
             <p:nvSpPr>
               <p:cNvPr id="9" name="TextBox 8">
@@ -10156,7 +10481,7 @@
             </p:txBody>
           </p:sp>
         </mc:Choice>
-        <mc:Fallback>
+        <mc:Fallback xmlns="">
           <p:sp>
             <p:nvSpPr>
               <p:cNvPr id="9" name="TextBox 8">
@@ -10201,8 +10526,8 @@
           </p:sp>
         </mc:Fallback>
       </mc:AlternateContent>
-      <mc:AlternateContent xmlns:mc="http://schemas.openxmlformats.org/markup-compatibility/2006">
-        <mc:Choice xmlns:a14="http://schemas.microsoft.com/office/drawing/2010/main" Requires="a14">
+      <mc:AlternateContent xmlns:mc="http://schemas.openxmlformats.org/markup-compatibility/2006" xmlns:a14="http://schemas.microsoft.com/office/drawing/2010/main">
+        <mc:Choice Requires="a14">
           <p:sp>
             <p:nvSpPr>
               <p:cNvPr id="10" name="TextBox 9">
@@ -10435,7 +10760,7 @@
             </p:txBody>
           </p:sp>
         </mc:Choice>
-        <mc:Fallback>
+        <mc:Fallback xmlns="">
           <p:sp>
             <p:nvSpPr>
               <p:cNvPr id="10" name="TextBox 9">
@@ -10599,8 +10924,8 @@
           </a:p>
         </p:txBody>
       </p:sp>
-      <mc:AlternateContent xmlns:mc="http://schemas.openxmlformats.org/markup-compatibility/2006">
-        <mc:Choice xmlns:a14="http://schemas.microsoft.com/office/drawing/2010/main" Requires="a14">
+      <mc:AlternateContent xmlns:mc="http://schemas.openxmlformats.org/markup-compatibility/2006" xmlns:a14="http://schemas.microsoft.com/office/drawing/2010/main">
+        <mc:Choice Requires="a14">
           <p:graphicFrame>
             <p:nvGraphicFramePr>
               <p:cNvPr id="5" name="Table 5">
@@ -11696,7 +12021,7 @@
             </a:graphic>
           </p:graphicFrame>
         </mc:Choice>
-        <mc:Fallback>
+        <mc:Fallback xmlns="">
           <p:graphicFrame>
             <p:nvGraphicFramePr>
               <p:cNvPr id="5" name="Table 5">
@@ -11930,8 +12255,8 @@
           </p:graphicFrame>
         </mc:Fallback>
       </mc:AlternateContent>
-      <mc:AlternateContent xmlns:mc="http://schemas.openxmlformats.org/markup-compatibility/2006">
-        <mc:Choice xmlns:a14="http://schemas.microsoft.com/office/drawing/2010/main" Requires="a14">
+      <mc:AlternateContent xmlns:mc="http://schemas.openxmlformats.org/markup-compatibility/2006" xmlns:a14="http://schemas.microsoft.com/office/drawing/2010/main">
+        <mc:Choice Requires="a14">
           <p:sp>
             <p:nvSpPr>
               <p:cNvPr id="7" name="TextBox 6">
@@ -12146,7 +12471,7 @@
             </p:txBody>
           </p:sp>
         </mc:Choice>
-        <mc:Fallback>
+        <mc:Fallback xmlns="">
           <p:sp>
             <p:nvSpPr>
               <p:cNvPr id="7" name="TextBox 6">
@@ -12191,8 +12516,8 @@
           </p:sp>
         </mc:Fallback>
       </mc:AlternateContent>
-      <mc:AlternateContent xmlns:mc="http://schemas.openxmlformats.org/markup-compatibility/2006">
-        <mc:Choice xmlns:a14="http://schemas.microsoft.com/office/drawing/2010/main" Requires="a14">
+      <mc:AlternateContent xmlns:mc="http://schemas.openxmlformats.org/markup-compatibility/2006" xmlns:a14="http://schemas.microsoft.com/office/drawing/2010/main">
+        <mc:Choice Requires="a14">
           <p:sp>
             <p:nvSpPr>
               <p:cNvPr id="9" name="TextBox 8">
@@ -12425,7 +12750,7 @@
             </p:txBody>
           </p:sp>
         </mc:Choice>
-        <mc:Fallback>
+        <mc:Fallback xmlns="">
           <p:sp>
             <p:nvSpPr>
               <p:cNvPr id="9" name="TextBox 8">
@@ -12470,8 +12795,8 @@
           </p:sp>
         </mc:Fallback>
       </mc:AlternateContent>
-      <mc:AlternateContent xmlns:mc="http://schemas.openxmlformats.org/markup-compatibility/2006">
-        <mc:Choice xmlns:a14="http://schemas.microsoft.com/office/drawing/2010/main" Requires="a14">
+      <mc:AlternateContent xmlns:mc="http://schemas.openxmlformats.org/markup-compatibility/2006" xmlns:a14="http://schemas.microsoft.com/office/drawing/2010/main">
+        <mc:Choice Requires="a14">
           <p:sp>
             <p:nvSpPr>
               <p:cNvPr id="10" name="TextBox 9">
@@ -12704,7 +13029,7 @@
             </p:txBody>
           </p:sp>
         </mc:Choice>
-        <mc:Fallback>
+        <mc:Fallback xmlns="">
           <p:sp>
             <p:nvSpPr>
               <p:cNvPr id="10" name="TextBox 9">
@@ -12876,8 +13201,8 @@
           </a:p>
         </p:txBody>
       </p:sp>
-      <mc:AlternateContent xmlns:mc="http://schemas.openxmlformats.org/markup-compatibility/2006">
-        <mc:Choice xmlns:a14="http://schemas.microsoft.com/office/drawing/2010/main" Requires="a14">
+      <mc:AlternateContent xmlns:mc="http://schemas.openxmlformats.org/markup-compatibility/2006" xmlns:a14="http://schemas.microsoft.com/office/drawing/2010/main">
+        <mc:Choice Requires="a14">
           <p:graphicFrame>
             <p:nvGraphicFramePr>
               <p:cNvPr id="5" name="Table 5">
@@ -13967,7 +14292,7 @@
             </a:graphic>
           </p:graphicFrame>
         </mc:Choice>
-        <mc:Fallback>
+        <mc:Fallback xmlns="">
           <p:graphicFrame>
             <p:nvGraphicFramePr>
               <p:cNvPr id="5" name="Table 5">
@@ -14195,8 +14520,8 @@
           </p:graphicFrame>
         </mc:Fallback>
       </mc:AlternateContent>
-      <mc:AlternateContent xmlns:mc="http://schemas.openxmlformats.org/markup-compatibility/2006">
-        <mc:Choice xmlns:a14="http://schemas.microsoft.com/office/drawing/2010/main" Requires="a14">
+      <mc:AlternateContent xmlns:mc="http://schemas.openxmlformats.org/markup-compatibility/2006" xmlns:a14="http://schemas.microsoft.com/office/drawing/2010/main">
+        <mc:Choice Requires="a14">
           <p:sp>
             <p:nvSpPr>
               <p:cNvPr id="7" name="TextBox 6">
@@ -14411,7 +14736,7 @@
             </p:txBody>
           </p:sp>
         </mc:Choice>
-        <mc:Fallback>
+        <mc:Fallback xmlns="">
           <p:sp>
             <p:nvSpPr>
               <p:cNvPr id="7" name="TextBox 6">
@@ -14456,8 +14781,8 @@
           </p:sp>
         </mc:Fallback>
       </mc:AlternateContent>
-      <mc:AlternateContent xmlns:mc="http://schemas.openxmlformats.org/markup-compatibility/2006">
-        <mc:Choice xmlns:a14="http://schemas.microsoft.com/office/drawing/2010/main" Requires="a14">
+      <mc:AlternateContent xmlns:mc="http://schemas.openxmlformats.org/markup-compatibility/2006" xmlns:a14="http://schemas.microsoft.com/office/drawing/2010/main">
+        <mc:Choice Requires="a14">
           <p:sp>
             <p:nvSpPr>
               <p:cNvPr id="9" name="TextBox 8">
@@ -14690,7 +15015,7 @@
             </p:txBody>
           </p:sp>
         </mc:Choice>
-        <mc:Fallback>
+        <mc:Fallback xmlns="">
           <p:sp>
             <p:nvSpPr>
               <p:cNvPr id="9" name="TextBox 8">
@@ -14735,8 +15060,8 @@
           </p:sp>
         </mc:Fallback>
       </mc:AlternateContent>
-      <mc:AlternateContent xmlns:mc="http://schemas.openxmlformats.org/markup-compatibility/2006">
-        <mc:Choice xmlns:a14="http://schemas.microsoft.com/office/drawing/2010/main" Requires="a14">
+      <mc:AlternateContent xmlns:mc="http://schemas.openxmlformats.org/markup-compatibility/2006" xmlns:a14="http://schemas.microsoft.com/office/drawing/2010/main">
+        <mc:Choice Requires="a14">
           <p:sp>
             <p:nvSpPr>
               <p:cNvPr id="10" name="TextBox 9">
@@ -14892,7 +15217,7 @@
             </p:txBody>
           </p:sp>
         </mc:Choice>
-        <mc:Fallback>
+        <mc:Fallback xmlns="">
           <p:sp>
             <p:nvSpPr>
               <p:cNvPr id="10" name="TextBox 9">
@@ -15064,8 +15389,8 @@
           </a:p>
         </p:txBody>
       </p:sp>
-      <mc:AlternateContent xmlns:mc="http://schemas.openxmlformats.org/markup-compatibility/2006">
-        <mc:Choice xmlns:a14="http://schemas.microsoft.com/office/drawing/2010/main" Requires="a14">
+      <mc:AlternateContent xmlns:mc="http://schemas.openxmlformats.org/markup-compatibility/2006" xmlns:a14="http://schemas.microsoft.com/office/drawing/2010/main">
+        <mc:Choice Requires="a14">
           <p:graphicFrame>
             <p:nvGraphicFramePr>
               <p:cNvPr id="5" name="Table 5">
@@ -15222,13 +15547,7 @@
                                   <a:rPr lang="en-US" sz="1200" b="0" i="1" dirty="0" smtClean="0">
                                     <a:latin typeface="Cambria Math" panose="02040503050406030204" pitchFamily="18" charset="0"/>
                                   </a:rPr>
-                                  <m:t>=1</m:t>
-                                </m:r>
-                                <m:r>
-                                  <a:rPr lang="en-US" sz="1200" b="0" i="1" dirty="0" smtClean="0">
-                                    <a:latin typeface="Cambria Math" panose="02040503050406030204" pitchFamily="18" charset="0"/>
-                                  </a:rPr>
-                                  <m:t>,</m:t>
+                                  <m:t>=1,</m:t>
                                 </m:r>
                                 <m:sSub>
                                   <m:sSubPr>
@@ -15425,13 +15744,7 @@
                                   <a:rPr lang="en-US" sz="1200" b="0" i="1" dirty="0" smtClean="0">
                                     <a:latin typeface="Cambria Math" panose="02040503050406030204" pitchFamily="18" charset="0"/>
                                   </a:rPr>
-                                  <m:t>=2</m:t>
-                                </m:r>
-                                <m:r>
-                                  <a:rPr lang="en-US" sz="1200" b="0" i="1" dirty="0" smtClean="0">
-                                    <a:latin typeface="Cambria Math" panose="02040503050406030204" pitchFamily="18" charset="0"/>
-                                  </a:rPr>
-                                  <m:t>,</m:t>
+                                  <m:t>=2,</m:t>
                                 </m:r>
                                 <m:sSub>
                                   <m:sSubPr>
@@ -15628,13 +15941,7 @@
                                   <a:rPr lang="en-US" sz="1200" b="0" i="1" dirty="0" smtClean="0">
                                     <a:latin typeface="Cambria Math" panose="02040503050406030204" pitchFamily="18" charset="0"/>
                                   </a:rPr>
-                                  <m:t>=3</m:t>
-                                </m:r>
-                                <m:r>
-                                  <a:rPr lang="en-US" sz="1200" b="0" i="1" dirty="0" smtClean="0">
-                                    <a:latin typeface="Cambria Math" panose="02040503050406030204" pitchFamily="18" charset="0"/>
-                                  </a:rPr>
-                                  <m:t>,</m:t>
+                                  <m:t>=3,</m:t>
                                 </m:r>
                                 <m:sSub>
                                   <m:sSubPr>
@@ -15841,13 +16148,7 @@
                                   <a:rPr lang="en-US" sz="1200" b="0" i="1" dirty="0" smtClean="0">
                                     <a:latin typeface="Cambria Math" panose="02040503050406030204" pitchFamily="18" charset="0"/>
                                   </a:rPr>
-                                  <m:t>=1</m:t>
-                                </m:r>
-                                <m:r>
-                                  <a:rPr lang="en-US" sz="1200" b="0" i="1" dirty="0" smtClean="0">
-                                    <a:latin typeface="Cambria Math" panose="02040503050406030204" pitchFamily="18" charset="0"/>
-                                  </a:rPr>
-                                  <m:t>,</m:t>
+                                  <m:t>=1,</m:t>
                                 </m:r>
                                 <m:sSub>
                                   <m:sSubPr>
@@ -16044,13 +16345,7 @@
                                   <a:rPr lang="en-US" sz="1200" b="0" i="1" dirty="0" smtClean="0">
                                     <a:latin typeface="Cambria Math" panose="02040503050406030204" pitchFamily="18" charset="0"/>
                                   </a:rPr>
-                                  <m:t>=2</m:t>
-                                </m:r>
-                                <m:r>
-                                  <a:rPr lang="en-US" sz="1200" b="0" i="1" dirty="0" smtClean="0">
-                                    <a:latin typeface="Cambria Math" panose="02040503050406030204" pitchFamily="18" charset="0"/>
-                                  </a:rPr>
-                                  <m:t>,</m:t>
+                                  <m:t>=2,</m:t>
                                 </m:r>
                                 <m:sSub>
                                   <m:sSubPr>
@@ -16244,13 +16539,7 @@
                                   <a:rPr lang="en-US" sz="1200" b="0" i="1" dirty="0" smtClean="0">
                                     <a:latin typeface="Cambria Math" panose="02040503050406030204" pitchFamily="18" charset="0"/>
                                   </a:rPr>
-                                  <m:t>=3</m:t>
-                                </m:r>
-                                <m:r>
-                                  <a:rPr lang="en-US" sz="1200" b="0" i="1" dirty="0" smtClean="0">
-                                    <a:latin typeface="Cambria Math" panose="02040503050406030204" pitchFamily="18" charset="0"/>
-                                  </a:rPr>
-                                  <m:t>,</m:t>
+                                  <m:t>=3,</m:t>
                                 </m:r>
                                 <m:sSub>
                                   <m:sSubPr>
@@ -16454,13 +16743,7 @@
                                   <a:rPr lang="en-US" sz="1200" b="0" i="1" dirty="0" smtClean="0">
                                     <a:latin typeface="Cambria Math" panose="02040503050406030204" pitchFamily="18" charset="0"/>
                                   </a:rPr>
-                                  <m:t>=1</m:t>
-                                </m:r>
-                                <m:r>
-                                  <a:rPr lang="en-US" sz="1200" b="0" i="1" dirty="0" smtClean="0">
-                                    <a:latin typeface="Cambria Math" panose="02040503050406030204" pitchFamily="18" charset="0"/>
-                                  </a:rPr>
-                                  <m:t>,</m:t>
+                                  <m:t>=1,</m:t>
                                 </m:r>
                                 <m:sSub>
                                   <m:sSubPr>
@@ -16660,13 +16943,7 @@
                                   <a:rPr lang="en-US" sz="1200" b="0" i="1" dirty="0" smtClean="0">
                                     <a:latin typeface="Cambria Math" panose="02040503050406030204" pitchFamily="18" charset="0"/>
                                   </a:rPr>
-                                  <m:t>=2</m:t>
-                                </m:r>
-                                <m:r>
-                                  <a:rPr lang="en-US" sz="1200" b="0" i="1" dirty="0" smtClean="0">
-                                    <a:latin typeface="Cambria Math" panose="02040503050406030204" pitchFamily="18" charset="0"/>
-                                  </a:rPr>
-                                  <m:t>,</m:t>
+                                  <m:t>=2,</m:t>
                                 </m:r>
                                 <m:sSub>
                                   <m:sSubPr>
@@ -16863,13 +17140,7 @@
                                   <a:rPr lang="en-US" sz="1200" b="0" i="1" dirty="0" smtClean="0">
                                     <a:latin typeface="Cambria Math" panose="02040503050406030204" pitchFamily="18" charset="0"/>
                                   </a:rPr>
-                                  <m:t>=3</m:t>
-                                </m:r>
-                                <m:r>
-                                  <a:rPr lang="en-US" sz="1200" b="0" i="1" dirty="0" smtClean="0">
-                                    <a:latin typeface="Cambria Math" panose="02040503050406030204" pitchFamily="18" charset="0"/>
-                                  </a:rPr>
-                                  <m:t>,</m:t>
+                                  <m:t>=3,</m:t>
                                 </m:r>
                                 <m:sSub>
                                   <m:sSubPr>
@@ -16962,7 +17233,7 @@
             </a:graphic>
           </p:graphicFrame>
         </mc:Choice>
-        <mc:Fallback>
+        <mc:Fallback xmlns="">
           <p:graphicFrame>
             <p:nvGraphicFramePr>
               <p:cNvPr id="5" name="Table 5">
@@ -17196,8 +17467,8 @@
           </p:graphicFrame>
         </mc:Fallback>
       </mc:AlternateContent>
-      <mc:AlternateContent xmlns:mc="http://schemas.openxmlformats.org/markup-compatibility/2006">
-        <mc:Choice xmlns:a14="http://schemas.microsoft.com/office/drawing/2010/main" Requires="a14">
+      <mc:AlternateContent xmlns:mc="http://schemas.openxmlformats.org/markup-compatibility/2006" xmlns:a14="http://schemas.microsoft.com/office/drawing/2010/main">
+        <mc:Choice Requires="a14">
           <p:sp>
             <p:nvSpPr>
               <p:cNvPr id="13" name="Content Placeholder 2">
@@ -17324,7 +17595,7 @@
             </p:txBody>
           </p:sp>
         </mc:Choice>
-        <mc:Fallback>
+        <mc:Fallback xmlns="">
           <p:sp>
             <p:nvSpPr>
               <p:cNvPr id="13" name="Content Placeholder 2">
@@ -19291,10 +19562,414 @@
           <a:chExt cx="0" cy="0"/>
         </a:xfrm>
       </p:grpSpPr>
+      <p:sp>
+        <p:nvSpPr>
+          <p:cNvPr id="4" name="Title 1">
+            <a:extLst>
+              <a:ext uri="{FF2B5EF4-FFF2-40B4-BE49-F238E27FC236}">
+                <a16:creationId xmlns:a16="http://schemas.microsoft.com/office/drawing/2014/main" id="{533E3851-7992-4FFF-A45F-3CDEBC4A50C7}"/>
+              </a:ext>
+            </a:extLst>
+          </p:cNvPr>
+          <p:cNvSpPr>
+            <a:spLocks noGrp="1"/>
+          </p:cNvSpPr>
+          <p:nvPr>
+            <p:ph type="title"/>
+          </p:nvPr>
+        </p:nvSpPr>
+        <p:spPr>
+          <a:xfrm>
+            <a:off x="838200" y="365125"/>
+            <a:ext cx="10515600" cy="1325563"/>
+          </a:xfrm>
+        </p:spPr>
+        <p:txBody>
+          <a:bodyPr/>
+          <a:lstStyle/>
+          <a:p>
+            <a:r>
+              <a:rPr lang="en-US" sz="4800" dirty="0"/>
+              <a:t>Hidden Markov Model</a:t>
+            </a:r>
+          </a:p>
+        </p:txBody>
+      </p:sp>
+      <p:sp>
+        <p:nvSpPr>
+          <p:cNvPr id="5" name="Content Placeholder 2">
+            <a:extLst>
+              <a:ext uri="{FF2B5EF4-FFF2-40B4-BE49-F238E27FC236}">
+                <a16:creationId xmlns:a16="http://schemas.microsoft.com/office/drawing/2014/main" id="{1406636E-C7BA-4A27-814A-025D5E477474}"/>
+              </a:ext>
+            </a:extLst>
+          </p:cNvPr>
+          <p:cNvSpPr>
+            <a:spLocks noGrp="1"/>
+          </p:cNvSpPr>
+          <p:nvPr>
+            <p:ph idx="1"/>
+          </p:nvPr>
+        </p:nvSpPr>
+        <p:spPr>
+          <a:xfrm>
+            <a:off x="838200" y="1825625"/>
+            <a:ext cx="10515600" cy="4351338"/>
+          </a:xfrm>
+        </p:spPr>
+        <p:txBody>
+          <a:bodyPr>
+            <a:normAutofit/>
+          </a:bodyPr>
+          <a:lstStyle/>
+          <a:p>
+            <a:pPr marL="0" indent="0">
+              <a:buNone/>
+            </a:pPr>
+            <a:r>
+              <a:rPr lang="en-US" sz="2400" dirty="0"/>
+              <a:t>Other possible models:</a:t>
+            </a:r>
+          </a:p>
+          <a:p>
+            <a:pPr marL="0" indent="0">
+              <a:buNone/>
+            </a:pPr>
+            <a:br>
+              <a:rPr lang="en-US" sz="2400" dirty="0"/>
+            </a:br>
+            <a:r>
+              <a:rPr lang="en-US" sz="2400" dirty="0"/>
+              <a:t>-No information to predict  state transitions?</a:t>
+            </a:r>
+          </a:p>
+          <a:p>
+            <a:pPr marL="0" indent="0">
+              <a:buNone/>
+            </a:pPr>
+            <a:r>
+              <a:rPr lang="en-US" sz="2400" dirty="0"/>
+              <a:t>	- Predict by “dwell time”</a:t>
+            </a:r>
+          </a:p>
+          <a:p>
+            <a:pPr marL="0" indent="0">
+              <a:buNone/>
+            </a:pPr>
+            <a:r>
+              <a:rPr lang="en-US" sz="2400" dirty="0"/>
+              <a:t>	- Predict by real time / trial number</a:t>
+            </a:r>
+          </a:p>
+          <a:p>
+            <a:pPr marL="0" indent="0">
+              <a:buNone/>
+            </a:pPr>
+            <a:r>
+              <a:rPr lang="en-US" sz="2400" dirty="0"/>
+              <a:t>	- Cumulative values of covariates, rewards, etc.</a:t>
+            </a:r>
+          </a:p>
+        </p:txBody>
+      </p:sp>
     </p:spTree>
     <p:extLst>
       <p:ext uri="{BB962C8B-B14F-4D97-AF65-F5344CB8AC3E}">
         <p14:creationId xmlns:p14="http://schemas.microsoft.com/office/powerpoint/2010/main" val="3682822634"/>
+      </p:ext>
+    </p:extLst>
+  </p:cSld>
+  <p:clrMapOvr>
+    <a:masterClrMapping/>
+  </p:clrMapOvr>
+</p:sld>
+</file>
+
+<file path=ppt/slides/slide28.xml><?xml version="1.0" encoding="utf-8"?>
+<p:sld xmlns:a="http://schemas.openxmlformats.org/drawingml/2006/main" xmlns:r="http://schemas.openxmlformats.org/officeDocument/2006/relationships" xmlns:p="http://schemas.openxmlformats.org/presentationml/2006/main">
+  <p:cSld>
+    <p:spTree>
+      <p:nvGrpSpPr>
+        <p:cNvPr id="1" name=""/>
+        <p:cNvGrpSpPr/>
+        <p:nvPr/>
+      </p:nvGrpSpPr>
+      <p:grpSpPr>
+        <a:xfrm>
+          <a:off x="0" y="0"/>
+          <a:ext cx="0" cy="0"/>
+          <a:chOff x="0" y="0"/>
+          <a:chExt cx="0" cy="0"/>
+        </a:xfrm>
+      </p:grpSpPr>
+      <p:sp>
+        <p:nvSpPr>
+          <p:cNvPr id="4" name="Title 1">
+            <a:extLst>
+              <a:ext uri="{FF2B5EF4-FFF2-40B4-BE49-F238E27FC236}">
+                <a16:creationId xmlns:a16="http://schemas.microsoft.com/office/drawing/2014/main" id="{533E3851-7992-4FFF-A45F-3CDEBC4A50C7}"/>
+              </a:ext>
+            </a:extLst>
+          </p:cNvPr>
+          <p:cNvSpPr>
+            <a:spLocks noGrp="1"/>
+          </p:cNvSpPr>
+          <p:nvPr>
+            <p:ph type="title"/>
+          </p:nvPr>
+        </p:nvSpPr>
+        <p:spPr>
+          <a:xfrm>
+            <a:off x="838200" y="365125"/>
+            <a:ext cx="10515600" cy="1325563"/>
+          </a:xfrm>
+        </p:spPr>
+        <p:txBody>
+          <a:bodyPr/>
+          <a:lstStyle/>
+          <a:p>
+            <a:r>
+              <a:rPr lang="en-US" sz="4800" dirty="0"/>
+              <a:t>Hidden Markov Model</a:t>
+            </a:r>
+          </a:p>
+        </p:txBody>
+      </p:sp>
+      <p:sp>
+        <p:nvSpPr>
+          <p:cNvPr id="5" name="Content Placeholder 2">
+            <a:extLst>
+              <a:ext uri="{FF2B5EF4-FFF2-40B4-BE49-F238E27FC236}">
+                <a16:creationId xmlns:a16="http://schemas.microsoft.com/office/drawing/2014/main" id="{1406636E-C7BA-4A27-814A-025D5E477474}"/>
+              </a:ext>
+            </a:extLst>
+          </p:cNvPr>
+          <p:cNvSpPr>
+            <a:spLocks noGrp="1"/>
+          </p:cNvSpPr>
+          <p:nvPr>
+            <p:ph idx="1"/>
+          </p:nvPr>
+        </p:nvSpPr>
+        <p:spPr>
+          <a:xfrm>
+            <a:off x="838200" y="1825625"/>
+            <a:ext cx="10515600" cy="4351338"/>
+          </a:xfrm>
+        </p:spPr>
+        <p:txBody>
+          <a:bodyPr>
+            <a:normAutofit/>
+          </a:bodyPr>
+          <a:lstStyle/>
+          <a:p>
+            <a:pPr marL="0" indent="0">
+              <a:buNone/>
+            </a:pPr>
+            <a:r>
+              <a:rPr lang="en-US" sz="2400" dirty="0"/>
+              <a:t>Other possible models:</a:t>
+            </a:r>
+          </a:p>
+          <a:p>
+            <a:pPr marL="0" indent="0">
+              <a:buNone/>
+            </a:pPr>
+            <a:br>
+              <a:rPr lang="en-US" sz="2400" dirty="0"/>
+            </a:br>
+            <a:r>
+              <a:rPr lang="en-US" sz="2400" dirty="0"/>
+              <a:t>- Predict subject-level parameters / effects?</a:t>
+            </a:r>
+          </a:p>
+          <a:p>
+            <a:pPr marL="0" indent="0">
+              <a:buNone/>
+            </a:pPr>
+            <a:r>
+              <a:rPr lang="en-US" sz="2400" dirty="0"/>
+              <a:t>	- Condition the hierarchical priors on subject-level covariates</a:t>
+            </a:r>
+          </a:p>
+          <a:p>
+            <a:pPr marL="0" indent="0">
+              <a:buNone/>
+            </a:pPr>
+            <a:r>
+              <a:rPr lang="en-US" sz="2400" dirty="0"/>
+              <a:t>		</a:t>
+            </a:r>
+            <a:r>
+              <a:rPr lang="en-US" sz="2000" dirty="0"/>
+              <a:t>-e.g., does age predict strategy?</a:t>
+            </a:r>
+            <a:endParaRPr lang="en-US" sz="2400" dirty="0"/>
+          </a:p>
+          <a:p>
+            <a:pPr marL="0" indent="0">
+              <a:buNone/>
+            </a:pPr>
+            <a:r>
+              <a:rPr lang="en-US" sz="2400" dirty="0"/>
+              <a:t>	- Model correlations </a:t>
+            </a:r>
+            <a:r>
+              <a:rPr lang="en-US" sz="2400" i="1" dirty="0"/>
+              <a:t>among parameters</a:t>
+            </a:r>
+          </a:p>
+          <a:p>
+            <a:pPr marL="0" indent="0">
+              <a:buNone/>
+            </a:pPr>
+            <a:r>
+              <a:rPr lang="en-US" sz="2000" i="1" dirty="0"/>
+              <a:t>		-</a:t>
+            </a:r>
+            <a:r>
+              <a:rPr lang="en-US" sz="2000" dirty="0"/>
+              <a:t>e.g., twin correlations for genetic/environmental influence on lapsing probability.</a:t>
+            </a:r>
+          </a:p>
+          <a:p>
+            <a:pPr marL="0" indent="0">
+              <a:buNone/>
+            </a:pPr>
+            <a:endParaRPr lang="en-US" sz="2400" dirty="0"/>
+          </a:p>
+        </p:txBody>
+      </p:sp>
+    </p:spTree>
+    <p:extLst>
+      <p:ext uri="{BB962C8B-B14F-4D97-AF65-F5344CB8AC3E}">
+        <p14:creationId xmlns:p14="http://schemas.microsoft.com/office/powerpoint/2010/main" val="30635348"/>
+      </p:ext>
+    </p:extLst>
+  </p:cSld>
+  <p:clrMapOvr>
+    <a:masterClrMapping/>
+  </p:clrMapOvr>
+</p:sld>
+</file>
+
+<file path=ppt/slides/slide29.xml><?xml version="1.0" encoding="utf-8"?>
+<p:sld xmlns:a="http://schemas.openxmlformats.org/drawingml/2006/main" xmlns:r="http://schemas.openxmlformats.org/officeDocument/2006/relationships" xmlns:p="http://schemas.openxmlformats.org/presentationml/2006/main">
+  <p:cSld>
+    <p:spTree>
+      <p:nvGrpSpPr>
+        <p:cNvPr id="1" name=""/>
+        <p:cNvGrpSpPr/>
+        <p:nvPr/>
+      </p:nvGrpSpPr>
+      <p:grpSpPr>
+        <a:xfrm>
+          <a:off x="0" y="0"/>
+          <a:ext cx="0" cy="0"/>
+          <a:chOff x="0" y="0"/>
+          <a:chExt cx="0" cy="0"/>
+        </a:xfrm>
+      </p:grpSpPr>
+      <p:sp>
+        <p:nvSpPr>
+          <p:cNvPr id="4" name="Title 1">
+            <a:extLst>
+              <a:ext uri="{FF2B5EF4-FFF2-40B4-BE49-F238E27FC236}">
+                <a16:creationId xmlns:a16="http://schemas.microsoft.com/office/drawing/2014/main" id="{533E3851-7992-4FFF-A45F-3CDEBC4A50C7}"/>
+              </a:ext>
+            </a:extLst>
+          </p:cNvPr>
+          <p:cNvSpPr>
+            <a:spLocks noGrp="1"/>
+          </p:cNvSpPr>
+          <p:nvPr>
+            <p:ph type="title"/>
+          </p:nvPr>
+        </p:nvSpPr>
+        <p:spPr>
+          <a:xfrm>
+            <a:off x="838200" y="365125"/>
+            <a:ext cx="10515600" cy="1325563"/>
+          </a:xfrm>
+        </p:spPr>
+        <p:txBody>
+          <a:bodyPr/>
+          <a:lstStyle/>
+          <a:p>
+            <a:r>
+              <a:rPr lang="en-US" sz="4800" dirty="0"/>
+              <a:t>Hidden Markov Model</a:t>
+            </a:r>
+          </a:p>
+        </p:txBody>
+      </p:sp>
+      <p:sp>
+        <p:nvSpPr>
+          <p:cNvPr id="5" name="Content Placeholder 2">
+            <a:extLst>
+              <a:ext uri="{FF2B5EF4-FFF2-40B4-BE49-F238E27FC236}">
+                <a16:creationId xmlns:a16="http://schemas.microsoft.com/office/drawing/2014/main" id="{1406636E-C7BA-4A27-814A-025D5E477474}"/>
+              </a:ext>
+            </a:extLst>
+          </p:cNvPr>
+          <p:cNvSpPr>
+            <a:spLocks noGrp="1"/>
+          </p:cNvSpPr>
+          <p:nvPr>
+            <p:ph idx="1"/>
+          </p:nvPr>
+        </p:nvSpPr>
+        <p:spPr>
+          <a:xfrm>
+            <a:off x="838200" y="1825625"/>
+            <a:ext cx="10515600" cy="4351338"/>
+          </a:xfrm>
+        </p:spPr>
+        <p:txBody>
+          <a:bodyPr>
+            <a:normAutofit/>
+          </a:bodyPr>
+          <a:lstStyle/>
+          <a:p>
+            <a:pPr marL="0" indent="0">
+              <a:buNone/>
+            </a:pPr>
+            <a:r>
+              <a:rPr lang="en-US" sz="2400" dirty="0"/>
+              <a:t>Other possible models:</a:t>
+            </a:r>
+          </a:p>
+          <a:p>
+            <a:pPr marL="0" indent="0">
+              <a:buNone/>
+            </a:pPr>
+            <a:br>
+              <a:rPr lang="en-US" sz="2400" dirty="0"/>
+            </a:br>
+            <a:r>
+              <a:rPr lang="en-US" sz="2400" dirty="0"/>
+              <a:t>-Predict </a:t>
+            </a:r>
+            <a:r>
+              <a:rPr lang="en-US" sz="2400" b="1" dirty="0"/>
+              <a:t>number of sub-models / strategies?</a:t>
+            </a:r>
+          </a:p>
+          <a:p>
+            <a:pPr marL="0" indent="0">
+              <a:buNone/>
+            </a:pPr>
+            <a:r>
+              <a:rPr lang="en-US" sz="2400" dirty="0"/>
+              <a:t>	- Difficult but possible!</a:t>
+            </a:r>
+          </a:p>
+        </p:txBody>
+      </p:sp>
+    </p:spTree>
+    <p:extLst>
+      <p:ext uri="{BB962C8B-B14F-4D97-AF65-F5344CB8AC3E}">
+        <p14:creationId xmlns:p14="http://schemas.microsoft.com/office/powerpoint/2010/main" val="306613090"/>
       </p:ext>
     </p:extLst>
   </p:cSld>
@@ -19740,7 +20415,7 @@
             <a:pPr lvl="1"/>
             <a:r>
               <a:rPr lang="en-US" dirty="0"/>
-              <a:t>Win-stay lose-switch</a:t>
+              <a:t>Win-stay lose-switch (previous stimulus)</a:t>
             </a:r>
           </a:p>
         </p:txBody>
@@ -19943,7 +20618,7 @@
             <a:pPr lvl="1"/>
             <a:r>
               <a:rPr lang="en-US" dirty="0"/>
-              <a:t>Win-stay lose-switch</a:t>
+              <a:t>Win-stay lose-switch (previous stimulus)</a:t>
             </a:r>
           </a:p>
         </p:txBody>
@@ -20118,13 +20793,13 @@
             <a:pPr lvl="1"/>
             <a:r>
               <a:rPr lang="en-US" dirty="0"/>
-              <a:t>Win-stay lose-switch</a:t>
+              <a:t>Win-stay lose-switch (previous stimulus)</a:t>
             </a:r>
           </a:p>
         </p:txBody>
       </p:sp>
-      <mc:AlternateContent xmlns:mc="http://schemas.openxmlformats.org/markup-compatibility/2006" xmlns:a14="http://schemas.microsoft.com/office/drawing/2010/main">
-        <mc:Choice Requires="a14">
+      <mc:AlternateContent xmlns:mc="http://schemas.openxmlformats.org/markup-compatibility/2006">
+        <mc:Choice xmlns:a14="http://schemas.microsoft.com/office/drawing/2010/main" Requires="a14">
           <p:sp>
             <p:nvSpPr>
               <p:cNvPr id="4" name="TextBox 3">
@@ -20139,7 +20814,7 @@
             </p:nvSpPr>
             <p:spPr>
               <a:xfrm>
-                <a:off x="5976851" y="3096491"/>
+                <a:off x="6052104" y="1952709"/>
                 <a:ext cx="6080760" cy="2558393"/>
               </a:xfrm>
               <a:prstGeom prst="rect">
@@ -20705,11 +21380,11 @@
               <a:p>
                 <a:r>
                   <a:rPr lang="en-US" sz="2000" dirty="0"/>
-                  <a:t>How many </a:t>
+                  <a:t>What value for</a:t>
                 </a:r>
                 <a:r>
                   <a:rPr lang="en-US" sz="2000" i="1" dirty="0"/>
-                  <a:t>k</a:t>
+                  <a:t> k</a:t>
                 </a:r>
                 <a:r>
                   <a:rPr lang="en-US" sz="2000" dirty="0"/>
@@ -20728,7 +21403,7 @@
             </p:txBody>
           </p:sp>
         </mc:Choice>
-        <mc:Fallback xmlns="">
+        <mc:Fallback>
           <p:sp>
             <p:nvSpPr>
               <p:cNvPr id="4" name="TextBox 3">
@@ -20745,7 +21420,7 @@
             </p:nvSpPr>
             <p:spPr>
               <a:xfrm>
-                <a:off x="5976851" y="3096491"/>
+                <a:off x="6052104" y="1952709"/>
                 <a:ext cx="6080760" cy="2558393"/>
               </a:xfrm>
               <a:prstGeom prst="rect">
@@ -20754,7 +21429,7 @@
               <a:blipFill>
                 <a:blip r:embed="rId2"/>
                 <a:stretch>
-                  <a:fillRect l="-2505" t="-8095"/>
+                  <a:fillRect l="-2608" t="-7857"/>
                 </a:stretch>
               </a:blipFill>
             </p:spPr>
@@ -20806,6 +21481,165 @@
           </a:p>
         </p:txBody>
       </p:sp>
+      <p:pic>
+        <p:nvPicPr>
+          <p:cNvPr id="5" name="Content Placeholder 4">
+            <a:extLst>
+              <a:ext uri="{FF2B5EF4-FFF2-40B4-BE49-F238E27FC236}">
+                <a16:creationId xmlns:a16="http://schemas.microsoft.com/office/drawing/2014/main" id="{4D749DCA-83A5-407E-8709-005E48D708B9}"/>
+              </a:ext>
+            </a:extLst>
+          </p:cNvPr>
+          <p:cNvPicPr>
+            <a:picLocks noChangeAspect="1"/>
+          </p:cNvPicPr>
+          <p:nvPr/>
+        </p:nvPicPr>
+        <p:blipFill rotWithShape="1">
+          <a:blip r:embed="rId3"/>
+          <a:srcRect l="3534" t="33633" r="33243" b="36313"/>
+          <a:stretch/>
+        </p:blipFill>
+        <p:spPr>
+          <a:xfrm>
+            <a:off x="7111228" y="4511102"/>
+            <a:ext cx="4632104" cy="2017690"/>
+          </a:xfrm>
+          <a:prstGeom prst="rect">
+            <a:avLst/>
+          </a:prstGeom>
+        </p:spPr>
+      </p:pic>
+      <p:sp>
+        <p:nvSpPr>
+          <p:cNvPr id="8" name="TextBox 7">
+            <a:extLst>
+              <a:ext uri="{FF2B5EF4-FFF2-40B4-BE49-F238E27FC236}">
+                <a16:creationId xmlns:a16="http://schemas.microsoft.com/office/drawing/2014/main" id="{C9CBFAC6-EC0E-476B-B7E7-68D7F50B2670}"/>
+              </a:ext>
+            </a:extLst>
+          </p:cNvPr>
+          <p:cNvSpPr txBox="1"/>
+          <p:nvPr/>
+        </p:nvSpPr>
+        <p:spPr>
+          <a:xfrm>
+            <a:off x="9597334" y="4133917"/>
+            <a:ext cx="1991451" cy="369332"/>
+          </a:xfrm>
+          <a:prstGeom prst="rect">
+            <a:avLst/>
+          </a:prstGeom>
+          <a:noFill/>
+        </p:spPr>
+        <p:txBody>
+          <a:bodyPr wrap="square">
+            <a:spAutoFit/>
+          </a:bodyPr>
+          <a:lstStyle/>
+          <a:p>
+            <a:pPr/>
+            <a:r>
+              <a:rPr lang="en-US" dirty="0"/>
+              <a:t>Logistic regressions</a:t>
+            </a:r>
+          </a:p>
+        </p:txBody>
+      </p:sp>
+      <mc:AlternateContent xmlns:mc="http://schemas.openxmlformats.org/markup-compatibility/2006">
+        <mc:Choice xmlns:a14="http://schemas.microsoft.com/office/drawing/2010/main" Requires="a14">
+          <p:sp>
+            <p:nvSpPr>
+              <p:cNvPr id="9" name="TextBox 8">
+                <a:extLst>
+                  <a:ext uri="{FF2B5EF4-FFF2-40B4-BE49-F238E27FC236}">
+                    <a16:creationId xmlns:a16="http://schemas.microsoft.com/office/drawing/2014/main" id="{D54FF35F-FDB7-47B5-9F50-D2C74381279C}"/>
+                  </a:ext>
+                </a:extLst>
+              </p:cNvPr>
+              <p:cNvSpPr txBox="1"/>
+              <p:nvPr/>
+            </p:nvSpPr>
+            <p:spPr>
+              <a:xfrm>
+                <a:off x="7263628" y="4195324"/>
+                <a:ext cx="1159099" cy="369332"/>
+              </a:xfrm>
+              <a:prstGeom prst="rect">
+                <a:avLst/>
+              </a:prstGeom>
+              <a:noFill/>
+            </p:spPr>
+            <p:txBody>
+              <a:bodyPr wrap="square">
+                <a:spAutoFit/>
+              </a:bodyPr>
+              <a:lstStyle/>
+              <a:p>
+                <a:pPr/>
+                <a14:m>
+                  <m:oMath xmlns:m="http://schemas.openxmlformats.org/officeDocument/2006/math">
+                    <m:r>
+                      <a:rPr lang="en-US" sz="1800" b="1" i="0" dirty="0" smtClean="0">
+                        <a:latin typeface="Cambria Math" panose="02040503050406030204" pitchFamily="18" charset="0"/>
+                      </a:rPr>
+                      <m:t>𝐀</m:t>
+                    </m:r>
+                  </m:oMath>
+                </a14:m>
+                <a:r>
+                  <a:rPr lang="en-US" dirty="0"/>
+                  <a:t> matrix</a:t>
+                </a:r>
+              </a:p>
+            </p:txBody>
+          </p:sp>
+        </mc:Choice>
+        <mc:Fallback>
+          <p:sp>
+            <p:nvSpPr>
+              <p:cNvPr id="9" name="TextBox 8">
+                <a:extLst>
+                  <a:ext uri="{FF2B5EF4-FFF2-40B4-BE49-F238E27FC236}">
+                    <a16:creationId xmlns:a16="http://schemas.microsoft.com/office/drawing/2014/main" id="{D54FF35F-FDB7-47B5-9F50-D2C74381279C}"/>
+                  </a:ext>
+                </a:extLst>
+              </p:cNvPr>
+              <p:cNvSpPr txBox="1">
+                <a:spLocks noRot="1" noChangeAspect="1" noMove="1" noResize="1" noEditPoints="1" noAdjustHandles="1" noChangeArrowheads="1" noChangeShapeType="1" noTextEdit="1"/>
+              </p:cNvSpPr>
+              <p:nvPr/>
+            </p:nvSpPr>
+            <p:spPr>
+              <a:xfrm>
+                <a:off x="7263628" y="4195324"/>
+                <a:ext cx="1159099" cy="369332"/>
+              </a:xfrm>
+              <a:prstGeom prst="rect">
+                <a:avLst/>
+              </a:prstGeom>
+              <a:blipFill>
+                <a:blip r:embed="rId4"/>
+                <a:stretch>
+                  <a:fillRect t="-8197" b="-24590"/>
+                </a:stretch>
+              </a:blipFill>
+            </p:spPr>
+            <p:txBody>
+              <a:bodyPr/>
+              <a:lstStyle/>
+              <a:p>
+                <a:r>
+                  <a:rPr lang="en-US">
+                    <a:noFill/>
+                  </a:rPr>
+                  <a:t> </a:t>
+                </a:r>
+              </a:p>
+            </p:txBody>
+          </p:sp>
+        </mc:Fallback>
+      </mc:AlternateContent>
     </p:spTree>
     <p:extLst>
       <p:ext uri="{BB962C8B-B14F-4D97-AF65-F5344CB8AC3E}">
@@ -20852,16 +21686,15 @@
             <p:ph idx="1"/>
           </p:nvPr>
         </p:nvPicPr>
-        <p:blipFill>
+        <p:blipFill rotWithShape="1">
           <a:blip r:embed="rId2"/>
-          <a:stretch>
-            <a:fillRect/>
-          </a:stretch>
+          <a:srcRect b="34267"/>
+          <a:stretch/>
         </p:blipFill>
         <p:spPr>
           <a:xfrm>
-            <a:off x="4647889" y="0"/>
-            <a:ext cx="7326395" cy="6713800"/>
+            <a:off x="4763799" y="1382333"/>
+            <a:ext cx="7326395" cy="4413162"/>
           </a:xfrm>
         </p:spPr>
       </p:pic>

</xml_diff>